<commit_message>
Ajuste de alguns nomes de campo
</commit_message>
<xml_diff>
--- a/doc/MER-Persistence.pptx
+++ b/doc/MER-Persistence.pptx
@@ -3785,7 +3785,7 @@
           <p:nvPr>
             <p:extLst>
               <p:ext uri="{D42A27DB-BD31-4B8C-83A1-F6EECF244321}">
-                <p14:modId xmlns:p14="http://schemas.microsoft.com/office/powerpoint/2010/main" val="3635802157"/>
+                <p14:modId xmlns:p14="http://schemas.microsoft.com/office/powerpoint/2010/main" val="2821052966"/>
               </p:ext>
             </p:extLst>
           </p:nvPr>
@@ -3979,7 +3979,7 @@
                     <a:p>
                       <a:r>
                         <a:rPr lang="pt-BR" sz="1000" dirty="0" err="1"/>
-                        <a:t>product_id</a:t>
+                        <a:t>productId</a:t>
                       </a:r>
                       <a:endParaRPr lang="pt-BR" sz="1000" dirty="0"/>
                     </a:p>
@@ -4976,7 +4976,7 @@
           <p:nvPr>
             <p:extLst>
               <p:ext uri="{D42A27DB-BD31-4B8C-83A1-F6EECF244321}">
-                <p14:modId xmlns:p14="http://schemas.microsoft.com/office/powerpoint/2010/main" val="788335468"/>
+                <p14:modId xmlns:p14="http://schemas.microsoft.com/office/powerpoint/2010/main" val="2417200690"/>
               </p:ext>
             </p:extLst>
           </p:nvPr>
@@ -5484,9 +5484,10 @@
                     <a:lstStyle/>
                     <a:p>
                       <a:r>
-                        <a:rPr lang="pt-BR" sz="1000" dirty="0"/>
-                        <a:t>age</a:t>
+                        <a:rPr lang="pt-BR" sz="1000" dirty="0" err="1"/>
+                        <a:t>birthDate</a:t>
                       </a:r>
+                      <a:endParaRPr lang="pt-BR" sz="1000" dirty="0"/>
                     </a:p>
                   </a:txBody>
                   <a:tcPr>
@@ -6554,7 +6555,7 @@
           <p:nvPr>
             <p:extLst>
               <p:ext uri="{D42A27DB-BD31-4B8C-83A1-F6EECF244321}">
-                <p14:modId xmlns:p14="http://schemas.microsoft.com/office/powerpoint/2010/main" val="2813223963"/>
+                <p14:modId xmlns:p14="http://schemas.microsoft.com/office/powerpoint/2010/main" val="2239534582"/>
               </p:ext>
             </p:extLst>
           </p:nvPr>
@@ -6748,7 +6749,7 @@
                     <a:p>
                       <a:r>
                         <a:rPr lang="pt-BR" sz="1000" dirty="0" err="1"/>
-                        <a:t>order_item_id</a:t>
+                        <a:t>orderItemId</a:t>
                       </a:r>
                       <a:endParaRPr lang="pt-BR" sz="1000" dirty="0"/>
                     </a:p>
@@ -6856,7 +6857,7 @@
                     <a:p>
                       <a:r>
                         <a:rPr lang="pt-BR" sz="1000" dirty="0" err="1"/>
-                        <a:t>order_id</a:t>
+                        <a:t>orderId</a:t>
                       </a:r>
                       <a:endParaRPr lang="pt-BR" sz="1000" dirty="0"/>
                     </a:p>
@@ -6964,7 +6965,7 @@
                     <a:p>
                       <a:r>
                         <a:rPr lang="pt-BR" sz="1000" dirty="0" err="1"/>
-                        <a:t>product_id</a:t>
+                        <a:t>productId</a:t>
                       </a:r>
                       <a:endParaRPr lang="pt-BR" sz="1000" dirty="0"/>
                     </a:p>

</xml_diff>